<commit_message>
added slides, midterm, fixed readme
</commit_message>
<xml_diff>
--- a/assignments/a3/a3.pptx
+++ b/assignments/a3/a3.pptx
@@ -876,7 +876,7 @@
           <a:p>
             <a:fld id="{12241623-A064-4BED-B073-BA4D61433402}" type="datetime1">
               <a:rPr lang="en-US" smtClean="0"/>
-              <a:t>3/31/2024</a:t>
+              <a:t>4/4/2024</a:t>
             </a:fld>
             <a:endParaRPr lang="en-US" dirty="0"/>
           </a:p>
@@ -1687,7 +1687,7 @@
           <a:p>
             <a:fld id="{6F86ED0C-1DA7-41F0-94CF-6218B1FEDFF1}" type="datetime1">
               <a:rPr lang="en-US" smtClean="0"/>
-              <a:t>3/31/2024</a:t>
+              <a:t>4/4/2024</a:t>
             </a:fld>
             <a:endParaRPr lang="en-US" dirty="0"/>
           </a:p>
@@ -1886,7 +1886,7 @@
           <a:p>
             <a:fld id="{EECF02AB-6034-4B88-BC5A-7C17CB0EF809}" type="datetime1">
               <a:rPr lang="en-US" smtClean="0"/>
-              <a:t>3/31/2024</a:t>
+              <a:t>4/4/2024</a:t>
             </a:fld>
             <a:endParaRPr lang="en-US" dirty="0"/>
           </a:p>
@@ -2121,7 +2121,7 @@
           <a:p>
             <a:fld id="{22F3E5F3-28EE-488F-BD53-B744C06C3DEC}" type="datetime1">
               <a:rPr lang="en-US" smtClean="0"/>
-              <a:t>3/31/2024</a:t>
+              <a:t>4/4/2024</a:t>
             </a:fld>
             <a:endParaRPr lang="en-US" dirty="0"/>
           </a:p>
@@ -4814,7 +4814,7 @@
           <a:p>
             <a:fld id="{E72EB70D-CD01-44DA-83B3-8FEB3383D307}" type="datetime1">
               <a:rPr lang="en-US" smtClean="0"/>
-              <a:t>3/31/2024</a:t>
+              <a:t>4/4/2024</a:t>
             </a:fld>
             <a:endParaRPr lang="en-US" dirty="0"/>
           </a:p>
@@ -5010,7 +5010,7 @@
           <a:p>
             <a:fld id="{D0158CFD-9357-46BE-A189-D637A67C8730}" type="datetime1">
               <a:rPr lang="en-US" smtClean="0"/>
-              <a:t>3/31/2024</a:t>
+              <a:t>4/4/2024</a:t>
             </a:fld>
             <a:endParaRPr lang="en-US" dirty="0"/>
           </a:p>
@@ -5399,7 +5399,7 @@
           <a:p>
             <a:fld id="{7B4742EE-B331-4632-BD10-A82FED6B6FC0}" type="datetime1">
               <a:rPr lang="en-US" smtClean="0"/>
-              <a:t>3/31/2024</a:t>
+              <a:t>4/4/2024</a:t>
             </a:fld>
             <a:endParaRPr lang="en-US" dirty="0"/>
           </a:p>
@@ -5565,7 +5565,7 @@
           <a:p>
             <a:fld id="{451BA835-D13F-49F4-8F11-5D576AC65FAD}" type="datetime1">
               <a:rPr lang="en-US" smtClean="0"/>
-              <a:t>3/31/2024</a:t>
+              <a:t>4/4/2024</a:t>
             </a:fld>
             <a:endParaRPr lang="en-US" dirty="0"/>
           </a:p>
@@ -5688,7 +5688,7 @@
           <a:p>
             <a:fld id="{ADBD1799-ACB5-4CB2-86A2-5C574F1C8706}" type="datetime1">
               <a:rPr lang="en-US" smtClean="0"/>
-              <a:t>3/31/2024</a:t>
+              <a:t>4/4/2024</a:t>
             </a:fld>
             <a:endParaRPr lang="en-US" dirty="0"/>
           </a:p>
@@ -5998,7 +5998,7 @@
           <a:p>
             <a:fld id="{ED5DD0D6-7A82-473E-879B-C6ECD6CCCFEC}" type="datetime1">
               <a:rPr lang="en-US" smtClean="0"/>
-              <a:t>3/31/2024</a:t>
+              <a:t>4/4/2024</a:t>
             </a:fld>
             <a:endParaRPr lang="en-US" dirty="0"/>
           </a:p>
@@ -6298,7 +6298,7 @@
           <a:p>
             <a:fld id="{D4605E03-BC17-41A7-854C-DFAB672737DC}" type="datetime1">
               <a:rPr lang="en-US" smtClean="0"/>
-              <a:t>3/31/2024</a:t>
+              <a:t>4/4/2024</a:t>
             </a:fld>
             <a:endParaRPr lang="en-US" dirty="0"/>
           </a:p>
@@ -6550,7 +6550,7 @@
           <a:p>
             <a:fld id="{C4408324-A84C-4A45-93B6-78D079CCE772}" type="datetime1">
               <a:rPr lang="en-US" smtClean="0"/>
-              <a:t>3/31/2024</a:t>
+              <a:t>4/4/2024</a:t>
             </a:fld>
             <a:endParaRPr lang="en-US" dirty="0"/>
           </a:p>
@@ -7998,15 +7998,7 @@
           <a:p>
             <a:r>
               <a:rPr lang="en-IN" dirty="0"/>
-              <a:t>What is </a:t>
-            </a:r>
-            <a:r>
-              <a:rPr lang="en-IN" dirty="0" err="1"/>
-              <a:t>SortQuest</a:t>
-            </a:r>
-            <a:r>
-              <a:rPr lang="en-IN" dirty="0"/>
-              <a:t>?</a:t>
+              <a:t>What is the game?</a:t>
             </a:r>
           </a:p>
         </p:txBody>
@@ -8038,7 +8030,7 @@
             </a:pPr>
             <a:r>
               <a:rPr lang="en-GB" dirty="0"/>
-              <a:t>SortQuest is a console-based Python game, using Object-Oriented Programming, designed to challenge players to sort lists of numbers.</a:t>
+              <a:t>The game is a console-based Python game, using Object-Oriented Programming, designed to challenge players to sort lists of numbers.</a:t>
             </a:r>
           </a:p>
           <a:p>
@@ -8879,7 +8871,7 @@
           <a:p>
             <a:r>
               <a:rPr lang="en-GB" sz="1000" dirty="0"/>
-              <a:t>Program starts with the instance of the Game class, initializing player lives, score, and creating levels of increasing difficulty.</a:t>
+              <a:t>Firstly, the game creates an object of Game class</a:t>
             </a:r>
           </a:p>
           <a:p>
@@ -8895,13 +8887,13 @@
             <a:endParaRPr lang="en-GB" sz="1000" dirty="0"/>
           </a:p>
           <a:p>
+            <a:endParaRPr lang="en-GB" sz="1000" dirty="0"/>
+          </a:p>
+          <a:p>
             <a:r>
               <a:rPr lang="en-GB" sz="1000" dirty="0"/>
-              <a:t>Upon starting, players are displayed with a welcome message that shows the game's objectives and instructions.</a:t>
-            </a:r>
-          </a:p>
-          <a:p>
-            <a:endParaRPr lang="en-GB" sz="1000" dirty="0"/>
+              <a:t>Then it is started with its start method.</a:t>
+            </a:r>
           </a:p>
         </p:txBody>
       </p:sp>
@@ -8920,13 +8912,13 @@
           <p:nvPr>
             <p:extLst>
               <p:ext uri="{D42A27DB-BD31-4B8C-83A1-F6EECF244321}">
-                <p14:modId xmlns:p14="http://schemas.microsoft.com/office/powerpoint/2010/main" val="768007049"/>
+                <p14:modId xmlns:p14="http://schemas.microsoft.com/office/powerpoint/2010/main" val="4191204061"/>
               </p:ext>
             </p:extLst>
           </p:nvPr>
         </p:nvGraphicFramePr>
         <p:xfrm>
-          <a:off x="2032792" y="2862120"/>
+          <a:off x="2032791" y="2728770"/>
           <a:ext cx="8126413" cy="5418137"/>
         </p:xfrm>
         <a:graphic>
@@ -8960,7 +8952,7 @@
                     </p:blipFill>
                     <p:spPr>
                       <a:xfrm>
-                        <a:off x="2032792" y="2862120"/>
+                        <a:off x="2032791" y="2728770"/>
                         <a:ext cx="8126413" cy="5418137"/>
                       </a:xfrm>
                       <a:prstGeom prst="rect">
@@ -8989,13 +8981,13 @@
           <p:nvPr>
             <p:extLst>
               <p:ext uri="{D42A27DB-BD31-4B8C-83A1-F6EECF244321}">
-                <p14:modId xmlns:p14="http://schemas.microsoft.com/office/powerpoint/2010/main" val="564769446"/>
+                <p14:modId xmlns:p14="http://schemas.microsoft.com/office/powerpoint/2010/main" val="3729513754"/>
               </p:ext>
             </p:extLst>
           </p:nvPr>
         </p:nvGraphicFramePr>
         <p:xfrm>
-          <a:off x="2032792" y="4695606"/>
+          <a:off x="2032790" y="4738469"/>
           <a:ext cx="8126413" cy="5418137"/>
         </p:xfrm>
         <a:graphic>
@@ -9029,7 +9021,7 @@
                     </p:blipFill>
                     <p:spPr>
                       <a:xfrm>
-                        <a:off x="2032792" y="4695606"/>
+                        <a:off x="2032790" y="4738469"/>
                         <a:ext cx="8126413" cy="5418137"/>
                       </a:xfrm>
                       <a:prstGeom prst="rect">
@@ -9126,17 +9118,14 @@
           <a:p>
             <a:r>
               <a:rPr lang="en-GB" sz="1000" dirty="0"/>
-              <a:t>Players are taken through levels sequentially. Each level presents a unique sorting challenge.</a:t>
+              <a:t>Game object iterates through each level, calling its play method</a:t>
             </a:r>
           </a:p>
           <a:p>
             <a:r>
               <a:rPr lang="en-GB" sz="1000" dirty="0"/>
-              <a:t>In each level, players are tasked with sorting a given array. The game captures the start time, awaits player input, and calculates the duration on submission. Scoring is based on completion time: under 10 seconds gives 100 points; 10 to 30 seconds gives 50 points; over 30 seconds or incorrect input costs a life.</a:t>
-            </a:r>
-          </a:p>
-          <a:p>
-            <a:endParaRPr lang="en-GB" sz="1000" dirty="0"/>
+              <a:t>Play method of that level is checks what the user have entered, if its equal to its sorted version, then it's going to pass the level and increase the score, otherwise the level fails, and this method returns the result to Game object </a:t>
+            </a:r>
           </a:p>
         </p:txBody>
       </p:sp>
@@ -9155,7 +9144,7 @@
           <p:nvPr>
             <p:extLst>
               <p:ext uri="{D42A27DB-BD31-4B8C-83A1-F6EECF244321}">
-                <p14:modId xmlns:p14="http://schemas.microsoft.com/office/powerpoint/2010/main" val="2501715651"/>
+                <p14:modId xmlns:p14="http://schemas.microsoft.com/office/powerpoint/2010/main" val="2939890026"/>
               </p:ext>
             </p:extLst>
           </p:nvPr>
@@ -9292,7 +9281,13 @@
           <a:p>
             <a:r>
               <a:rPr lang="en-GB" sz="1000" dirty="0"/>
-              <a:t>The game ends either when all levels are successfully completed, or the player runs out of lives. A final score is displayed, along with a message to the player's outcome.</a:t>
+              <a:t>Game check the result and take action according to it and prints a message.</a:t>
+            </a:r>
+          </a:p>
+          <a:p>
+            <a:r>
+              <a:rPr lang="en-GB" sz="1000" dirty="0"/>
+              <a:t>The game ends when you pass every level or loses all of your lives</a:t>
             </a:r>
             <a:endParaRPr lang="en-IN" sz="1000" dirty="0"/>
           </a:p>
@@ -9313,13 +9308,13 @@
           <p:nvPr>
             <p:extLst>
               <p:ext uri="{D42A27DB-BD31-4B8C-83A1-F6EECF244321}">
-                <p14:modId xmlns:p14="http://schemas.microsoft.com/office/powerpoint/2010/main" val="913966298"/>
+                <p14:modId xmlns:p14="http://schemas.microsoft.com/office/powerpoint/2010/main" val="627167401"/>
               </p:ext>
             </p:extLst>
           </p:nvPr>
         </p:nvGraphicFramePr>
         <p:xfrm>
-          <a:off x="2067718" y="2904662"/>
+          <a:off x="2067718" y="3118975"/>
           <a:ext cx="8056563" cy="5367337"/>
         </p:xfrm>
         <a:graphic>
@@ -9353,7 +9348,7 @@
                     </p:blipFill>
                     <p:spPr>
                       <a:xfrm>
-                        <a:off x="2067718" y="2904662"/>
+                        <a:off x="2067718" y="3118975"/>
                         <a:ext cx="8056563" cy="5367337"/>
                       </a:xfrm>
                       <a:prstGeom prst="rect">

</xml_diff>